<commit_message>
added modifications from 2019
</commit_message>
<xml_diff>
--- a/Wi19_content/SEDS/L6.NothingToSomething.pptx
+++ b/Wi19_content/SEDS/L6.NothingToSomething.pptx
@@ -227,7 +227,7 @@
           <a:p>
             <a:fld id="{08F62E20-B1AA-3442-B8F1-F4A56998389D}" type="datetimeFigureOut">
               <a:rPr lang="en-US" smtClean="0"/>
-              <a:t>1/25/18</a:t>
+              <a:t>2/7/19</a:t>
             </a:fld>
             <a:endParaRPr lang="en-US"/>
           </a:p>
@@ -768,7 +768,7 @@
           <a:p>
             <a:fld id="{2691D6E4-0F7A-0249-86EF-226720E50E4C}" type="datetimeFigureOut">
               <a:rPr lang="en-US" smtClean="0"/>
-              <a:t>1/25/18</a:t>
+              <a:t>2/7/19</a:t>
             </a:fld>
             <a:endParaRPr lang="en-US"/>
           </a:p>
@@ -962,7 +962,7 @@
           <a:p>
             <a:fld id="{2691D6E4-0F7A-0249-86EF-226720E50E4C}" type="datetimeFigureOut">
               <a:rPr lang="en-US" smtClean="0"/>
-              <a:t>1/25/18</a:t>
+              <a:t>2/7/19</a:t>
             </a:fld>
             <a:endParaRPr lang="en-US"/>
           </a:p>
@@ -1166,7 +1166,7 @@
           <a:p>
             <a:fld id="{2691D6E4-0F7A-0249-86EF-226720E50E4C}" type="datetimeFigureOut">
               <a:rPr lang="en-US" smtClean="0"/>
-              <a:t>1/25/18</a:t>
+              <a:t>2/7/19</a:t>
             </a:fld>
             <a:endParaRPr lang="en-US"/>
           </a:p>
@@ -1360,7 +1360,7 @@
           <a:p>
             <a:fld id="{2691D6E4-0F7A-0249-86EF-226720E50E4C}" type="datetimeFigureOut">
               <a:rPr lang="en-US" smtClean="0"/>
-              <a:t>1/25/18</a:t>
+              <a:t>2/7/19</a:t>
             </a:fld>
             <a:endParaRPr lang="en-US"/>
           </a:p>
@@ -1630,7 +1630,7 @@
           <a:p>
             <a:fld id="{2691D6E4-0F7A-0249-86EF-226720E50E4C}" type="datetimeFigureOut">
               <a:rPr lang="en-US" smtClean="0"/>
-              <a:t>1/25/18</a:t>
+              <a:t>2/7/19</a:t>
             </a:fld>
             <a:endParaRPr lang="en-US"/>
           </a:p>
@@ -1942,7 +1942,7 @@
           <a:p>
             <a:fld id="{2691D6E4-0F7A-0249-86EF-226720E50E4C}" type="datetimeFigureOut">
               <a:rPr lang="en-US" smtClean="0"/>
-              <a:t>1/25/18</a:t>
+              <a:t>2/7/19</a:t>
             </a:fld>
             <a:endParaRPr lang="en-US"/>
           </a:p>
@@ -2388,7 +2388,7 @@
           <a:p>
             <a:fld id="{2691D6E4-0F7A-0249-86EF-226720E50E4C}" type="datetimeFigureOut">
               <a:rPr lang="en-US" smtClean="0"/>
-              <a:t>1/25/18</a:t>
+              <a:t>2/7/19</a:t>
             </a:fld>
             <a:endParaRPr lang="en-US"/>
           </a:p>
@@ -2530,7 +2530,7 @@
           <a:p>
             <a:fld id="{2691D6E4-0F7A-0249-86EF-226720E50E4C}" type="datetimeFigureOut">
               <a:rPr lang="en-US" smtClean="0"/>
-              <a:t>1/25/18</a:t>
+              <a:t>2/7/19</a:t>
             </a:fld>
             <a:endParaRPr lang="en-US"/>
           </a:p>
@@ -2649,7 +2649,7 @@
           <a:p>
             <a:fld id="{2691D6E4-0F7A-0249-86EF-226720E50E4C}" type="datetimeFigureOut">
               <a:rPr lang="en-US" smtClean="0"/>
-              <a:t>1/25/18</a:t>
+              <a:t>2/7/19</a:t>
             </a:fld>
             <a:endParaRPr lang="en-US"/>
           </a:p>
@@ -2950,7 +2950,7 @@
           <a:p>
             <a:fld id="{2691D6E4-0F7A-0249-86EF-226720E50E4C}" type="datetimeFigureOut">
               <a:rPr lang="en-US" smtClean="0"/>
-              <a:t>1/25/18</a:t>
+              <a:t>2/7/19</a:t>
             </a:fld>
             <a:endParaRPr lang="en-US"/>
           </a:p>
@@ -3227,7 +3227,7 @@
           <a:p>
             <a:fld id="{2691D6E4-0F7A-0249-86EF-226720E50E4C}" type="datetimeFigureOut">
               <a:rPr lang="en-US" smtClean="0"/>
-              <a:t>1/25/18</a:t>
+              <a:t>2/7/19</a:t>
             </a:fld>
             <a:endParaRPr lang="en-US"/>
           </a:p>
@@ -4282,7 +4282,6 @@
               <a:rPr lang="en-US" sz="3600" dirty="0" smtClean="0"/>
               <a:t>) </a:t>
             </a:r>
-            <a:endParaRPr lang="en-US" sz="3600" dirty="0" smtClean="0"/>
           </a:p>
           <a:p>
             <a:r>
@@ -4461,33 +4460,17 @@
               <a:rPr lang="en-US" dirty="0" smtClean="0">
                 <a:latin typeface="Calibri" charset="0"/>
               </a:rPr>
-              <a:t>Functions?</a:t>
+              <a:t>Functions</a:t>
+            </a:r>
+            <a:r>
+              <a:rPr lang="en-US" dirty="0" smtClean="0">
+                <a:latin typeface="Calibri" charset="0"/>
+              </a:rPr>
+              <a:t>?</a:t>
             </a:r>
             <a:endParaRPr lang="en-US" dirty="0" smtClean="0">
               <a:latin typeface="Calibri" charset="0"/>
             </a:endParaRPr>
-          </a:p>
-          <a:p>
-            <a:pPr>
-              <a:spcBef>
-                <a:spcPts val="800"/>
-              </a:spcBef>
-              <a:buFont typeface="Arial" charset="0"/>
-              <a:buChar char="•"/>
-              <a:defRPr/>
-            </a:pPr>
-            <a:r>
-              <a:rPr lang="en-US" dirty="0" smtClean="0">
-                <a:latin typeface="Calibri" charset="0"/>
-              </a:rPr>
-              <a:t>Questions from this morning?</a:t>
-            </a:r>
-            <a:endParaRPr lang="en-US" dirty="0">
-              <a:latin typeface="Calibri" charset="0"/>
-            </a:endParaRPr>
-          </a:p>
-          <a:p>
-            <a:endParaRPr lang="en-US" dirty="0"/>
           </a:p>
         </p:txBody>
       </p:sp>

</xml_diff>